<commit_message>
copy all submission files to one folder
</commit_message>
<xml_diff>
--- a/submissions/phase3/stepvii.pptx
+++ b/submissions/phase3/stepvii.pptx
@@ -283,7 +283,7 @@
           <a:p>
             <a:fld id="{3DB9E677-34D2-47F7-8A52-8C0DC0CABEB7}" type="datetimeFigureOut">
               <a:rPr lang="zh-CN" altLang="en-US" smtClean="0"/>
-              <a:t>2023/12/10</a:t>
+              <a:t>2023/12/11</a:t>
             </a:fld>
             <a:endParaRPr lang="zh-CN" altLang="en-US"/>
           </a:p>
@@ -483,7 +483,7 @@
           <a:p>
             <a:fld id="{3DB9E677-34D2-47F7-8A52-8C0DC0CABEB7}" type="datetimeFigureOut">
               <a:rPr lang="zh-CN" altLang="en-US" smtClean="0"/>
-              <a:t>2023/12/10</a:t>
+              <a:t>2023/12/11</a:t>
             </a:fld>
             <a:endParaRPr lang="zh-CN" altLang="en-US"/>
           </a:p>
@@ -693,7 +693,7 @@
           <a:p>
             <a:fld id="{3DB9E677-34D2-47F7-8A52-8C0DC0CABEB7}" type="datetimeFigureOut">
               <a:rPr lang="zh-CN" altLang="en-US" smtClean="0"/>
-              <a:t>2023/12/10</a:t>
+              <a:t>2023/12/11</a:t>
             </a:fld>
             <a:endParaRPr lang="zh-CN" altLang="en-US"/>
           </a:p>
@@ -893,7 +893,7 @@
           <a:p>
             <a:fld id="{3DB9E677-34D2-47F7-8A52-8C0DC0CABEB7}" type="datetimeFigureOut">
               <a:rPr lang="zh-CN" altLang="en-US" smtClean="0"/>
-              <a:t>2023/12/10</a:t>
+              <a:t>2023/12/11</a:t>
             </a:fld>
             <a:endParaRPr lang="zh-CN" altLang="en-US"/>
           </a:p>
@@ -1169,7 +1169,7 @@
           <a:p>
             <a:fld id="{3DB9E677-34D2-47F7-8A52-8C0DC0CABEB7}" type="datetimeFigureOut">
               <a:rPr lang="zh-CN" altLang="en-US" smtClean="0"/>
-              <a:t>2023/12/10</a:t>
+              <a:t>2023/12/11</a:t>
             </a:fld>
             <a:endParaRPr lang="zh-CN" altLang="en-US"/>
           </a:p>
@@ -1437,7 +1437,7 @@
           <a:p>
             <a:fld id="{3DB9E677-34D2-47F7-8A52-8C0DC0CABEB7}" type="datetimeFigureOut">
               <a:rPr lang="zh-CN" altLang="en-US" smtClean="0"/>
-              <a:t>2023/12/10</a:t>
+              <a:t>2023/12/11</a:t>
             </a:fld>
             <a:endParaRPr lang="zh-CN" altLang="en-US"/>
           </a:p>
@@ -1852,7 +1852,7 @@
           <a:p>
             <a:fld id="{3DB9E677-34D2-47F7-8A52-8C0DC0CABEB7}" type="datetimeFigureOut">
               <a:rPr lang="zh-CN" altLang="en-US" smtClean="0"/>
-              <a:t>2023/12/10</a:t>
+              <a:t>2023/12/11</a:t>
             </a:fld>
             <a:endParaRPr lang="zh-CN" altLang="en-US"/>
           </a:p>
@@ -1994,7 +1994,7 @@
           <a:p>
             <a:fld id="{3DB9E677-34D2-47F7-8A52-8C0DC0CABEB7}" type="datetimeFigureOut">
               <a:rPr lang="zh-CN" altLang="en-US" smtClean="0"/>
-              <a:t>2023/12/10</a:t>
+              <a:t>2023/12/11</a:t>
             </a:fld>
             <a:endParaRPr lang="zh-CN" altLang="en-US"/>
           </a:p>
@@ -2107,7 +2107,7 @@
           <a:p>
             <a:fld id="{3DB9E677-34D2-47F7-8A52-8C0DC0CABEB7}" type="datetimeFigureOut">
               <a:rPr lang="zh-CN" altLang="en-US" smtClean="0"/>
-              <a:t>2023/12/10</a:t>
+              <a:t>2023/12/11</a:t>
             </a:fld>
             <a:endParaRPr lang="zh-CN" altLang="en-US"/>
           </a:p>
@@ -2420,7 +2420,7 @@
           <a:p>
             <a:fld id="{3DB9E677-34D2-47F7-8A52-8C0DC0CABEB7}" type="datetimeFigureOut">
               <a:rPr lang="zh-CN" altLang="en-US" smtClean="0"/>
-              <a:t>2023/12/10</a:t>
+              <a:t>2023/12/11</a:t>
             </a:fld>
             <a:endParaRPr lang="zh-CN" altLang="en-US"/>
           </a:p>
@@ -2709,7 +2709,7 @@
           <a:p>
             <a:fld id="{3DB9E677-34D2-47F7-8A52-8C0DC0CABEB7}" type="datetimeFigureOut">
               <a:rPr lang="zh-CN" altLang="en-US" smtClean="0"/>
-              <a:t>2023/12/10</a:t>
+              <a:t>2023/12/11</a:t>
             </a:fld>
             <a:endParaRPr lang="zh-CN" altLang="en-US"/>
           </a:p>
@@ -2952,7 +2952,7 @@
           <a:p>
             <a:fld id="{3DB9E677-34D2-47F7-8A52-8C0DC0CABEB7}" type="datetimeFigureOut">
               <a:rPr lang="zh-CN" altLang="en-US" smtClean="0"/>
-              <a:t>2023/12/10</a:t>
+              <a:t>2023/12/11</a:t>
             </a:fld>
             <a:endParaRPr lang="zh-CN" altLang="en-US"/>
           </a:p>
@@ -3956,7 +3956,7 @@
         <p:spPr>
           <a:xfrm>
             <a:off x="755662" y="1449180"/>
-            <a:ext cx="10680676" cy="2065309"/>
+            <a:ext cx="10680676" cy="3394840"/>
           </a:xfrm>
           <a:prstGeom prst="rect">
             <a:avLst/>
@@ -3995,13 +3995,63 @@
           <a:p>
             <a:r>
               <a:rPr lang="en-US" altLang="zh-CN" dirty="0"/>
-              <a:t>Initially, the goal is to increase the efficiency of targeted advertising by accurately predicting the likelihood of a user clicking on an advertisement, enabling improved return on investment (ROI) and lower cost on advertising. Therefore, we want to find the best model for the CTR (Click-Through Rate) prediction.</a:t>
+              <a:t>Initially, the goal is to increase the efficiency of targeted advertising by </a:t>
+            </a:r>
+            <a:r>
+              <a:rPr lang="en-US" altLang="zh-CN" b="1" dirty="0">
+                <a:solidFill>
+                  <a:srgbClr val="D41B2C"/>
+                </a:solidFill>
+              </a:rPr>
+              <a:t>accurately predicting the likelihood of a user clicking on an advertisement</a:t>
+            </a:r>
+            <a:r>
+              <a:rPr lang="en-US" altLang="zh-CN" dirty="0"/>
+              <a:t>, enabling improved return on investment (ROI) and lower cost on advertising. Therefore, we want to find the best model for the CTR (Click-Through Rate) prediction.</a:t>
             </a:r>
           </a:p>
           <a:p>
             <a:r>
               <a:rPr lang="en-US" altLang="zh-CN" dirty="0"/>
               <a:t>There are many performance metrices to evaluate the model. In our project, we decide to focus on minimizing false positives while balancing with other metrics. </a:t>
+            </a:r>
+          </a:p>
+          <a:p>
+            <a:r>
+              <a:rPr lang="en-US" dirty="0"/>
+              <a:t>We mainly consider </a:t>
+            </a:r>
+            <a:r>
+              <a:rPr lang="en-US" b="1" dirty="0">
+                <a:solidFill>
+                  <a:srgbClr val="D41B2C"/>
+                </a:solidFill>
+              </a:rPr>
+              <a:t>precision</a:t>
+            </a:r>
+            <a:r>
+              <a:rPr lang="en-US" dirty="0"/>
+              <a:t> or </a:t>
+            </a:r>
+            <a:r>
+              <a:rPr lang="en-US" b="1" dirty="0">
+                <a:solidFill>
+                  <a:srgbClr val="D41B2C"/>
+                </a:solidFill>
+              </a:rPr>
+              <a:t>false positive </a:t>
+            </a:r>
+            <a:r>
+              <a:rPr lang="en-US" dirty="0"/>
+              <a:t>rather than false negative because the project target is recommending advertisements to users based on the click rate prediction. As a result, higher false positive would show more advertisements that the user would be less likely to click. And this could make the user feel less engaged and tend the leave the </a:t>
+            </a:r>
+            <a:r>
+              <a:rPr lang="en-US" dirty="0" err="1"/>
+              <a:t>applicaton</a:t>
+            </a:r>
+            <a:r>
+              <a:rPr lang="en-US" dirty="0"/>
+              <a:t>. </a:t>
             </a:r>
           </a:p>
         </p:txBody>
@@ -4162,60 +4212,927 @@
       </p:sp>
       <p:sp>
         <p:nvSpPr>
-          <p:cNvPr id="23" name="TextBox 22">
-            <a:extLst>
-              <a:ext uri="{FF2B5EF4-FFF2-40B4-BE49-F238E27FC236}">
-                <a16:creationId xmlns:a16="http://schemas.microsoft.com/office/drawing/2014/main" id="{742B14A2-D146-B892-E3CD-390FF76507ED}"/>
-              </a:ext>
-            </a:extLst>
-          </p:cNvPr>
-          <p:cNvSpPr txBox="1"/>
+          <p:cNvPr id="3" name="Rectangle 2">
+            <a:extLst>
+              <a:ext uri="{FF2B5EF4-FFF2-40B4-BE49-F238E27FC236}">
+                <a16:creationId xmlns:a16="http://schemas.microsoft.com/office/drawing/2014/main" id="{C47F5139-661F-8BDD-4BF3-D3BECF19039F}"/>
+              </a:ext>
+            </a:extLst>
+          </p:cNvPr>
+          <p:cNvSpPr/>
           <p:nvPr/>
         </p:nvSpPr>
         <p:spPr>
           <a:xfrm>
-            <a:off x="1071347" y="1432479"/>
-            <a:ext cx="10049305" cy="403316"/>
+            <a:off x="1148350" y="1591004"/>
+            <a:ext cx="1935126" cy="710680"/>
           </a:xfrm>
           <a:prstGeom prst="rect">
             <a:avLst/>
           </a:prstGeom>
-          <a:noFill/>
-        </p:spPr>
-        <p:txBody>
-          <a:bodyPr wrap="square">
-            <a:spAutoFit/>
-          </a:bodyPr>
-          <a:lstStyle>
-            <a:defPPr>
-              <a:defRPr lang="zh-CN"/>
-            </a:defPPr>
-            <a:lvl1pPr marL="285750" indent="-285750">
-              <a:lnSpc>
-                <a:spcPct val="120000"/>
-              </a:lnSpc>
-              <a:buClr>
-                <a:srgbClr val="D41B2C"/>
-              </a:buClr>
-              <a:buFont typeface="Wingdings" panose="05000000000000000000" pitchFamily="2" charset="2"/>
-              <a:buChar char="n"/>
-            </a:lvl1pPr>
-            <a:lvl2pPr marL="742950" lvl="1" indent="-285750">
-              <a:lnSpc>
-                <a:spcPct val="120000"/>
-              </a:lnSpc>
-              <a:buClr>
-                <a:srgbClr val="D41B2C"/>
-              </a:buClr>
-              <a:buFont typeface="Arial" panose="020B0604020202020204" pitchFamily="34" charset="0"/>
-              <a:buChar char="•"/>
-            </a:lvl2pPr>
-          </a:lstStyle>
-          <a:p>
-            <a:r>
-              <a:rPr lang="en-US" altLang="zh-CN" dirty="0"/>
-              <a:t>Todo</a:t>
-            </a:r>
+        </p:spPr>
+        <p:style>
+          <a:lnRef idx="2">
+            <a:schemeClr val="accent1">
+              <a:shade val="15000"/>
+            </a:schemeClr>
+          </a:lnRef>
+          <a:fillRef idx="1">
+            <a:schemeClr val="accent1"/>
+          </a:fillRef>
+          <a:effectRef idx="0">
+            <a:schemeClr val="accent1"/>
+          </a:effectRef>
+          <a:fontRef idx="minor">
+            <a:schemeClr val="lt1"/>
+          </a:fontRef>
+        </p:style>
+        <p:txBody>
+          <a:bodyPr rtlCol="0" anchor="ctr"/>
+          <a:lstStyle/>
+          <a:p>
+            <a:pPr algn="ctr"/>
+            <a:r>
+              <a:rPr lang="en-US" altLang="zh-CN" b="1" dirty="0"/>
+              <a:t>Read in data</a:t>
+            </a:r>
+            <a:endParaRPr lang="zh-CN" altLang="en-US" b="1" dirty="0"/>
+          </a:p>
+        </p:txBody>
+      </p:sp>
+      <p:sp>
+        <p:nvSpPr>
+          <p:cNvPr id="4" name="Rectangle 3">
+            <a:extLst>
+              <a:ext uri="{FF2B5EF4-FFF2-40B4-BE49-F238E27FC236}">
+                <a16:creationId xmlns:a16="http://schemas.microsoft.com/office/drawing/2014/main" id="{949807F5-E461-4411-33FA-EA6D6E862B56}"/>
+              </a:ext>
+            </a:extLst>
+          </p:cNvPr>
+          <p:cNvSpPr/>
+          <p:nvPr/>
+        </p:nvSpPr>
+        <p:spPr>
+          <a:xfrm>
+            <a:off x="3585389" y="1591004"/>
+            <a:ext cx="1935126" cy="710680"/>
+          </a:xfrm>
+          <a:prstGeom prst="rect">
+            <a:avLst/>
+          </a:prstGeom>
+        </p:spPr>
+        <p:style>
+          <a:lnRef idx="2">
+            <a:schemeClr val="accent1">
+              <a:shade val="15000"/>
+            </a:schemeClr>
+          </a:lnRef>
+          <a:fillRef idx="1">
+            <a:schemeClr val="accent1"/>
+          </a:fillRef>
+          <a:effectRef idx="0">
+            <a:schemeClr val="accent1"/>
+          </a:effectRef>
+          <a:fontRef idx="minor">
+            <a:schemeClr val="lt1"/>
+          </a:fontRef>
+        </p:style>
+        <p:txBody>
+          <a:bodyPr rtlCol="0" anchor="ctr"/>
+          <a:lstStyle/>
+          <a:p>
+            <a:pPr algn="ctr"/>
+            <a:r>
+              <a:rPr lang="en-US" altLang="zh-CN" b="1" dirty="0"/>
+              <a:t>Drop duplicate </a:t>
+            </a:r>
+            <a:r>
+              <a:rPr lang="en-US" altLang="zh-CN" b="1" dirty="0" err="1"/>
+              <a:t>obs</a:t>
+            </a:r>
+            <a:endParaRPr lang="zh-CN" altLang="en-US" b="1" dirty="0"/>
+          </a:p>
+        </p:txBody>
+      </p:sp>
+      <p:sp>
+        <p:nvSpPr>
+          <p:cNvPr id="5" name="Rectangle 4">
+            <a:extLst>
+              <a:ext uri="{FF2B5EF4-FFF2-40B4-BE49-F238E27FC236}">
+                <a16:creationId xmlns:a16="http://schemas.microsoft.com/office/drawing/2014/main" id="{CA8DA026-F61F-5718-3A5C-1A6032C4810D}"/>
+              </a:ext>
+            </a:extLst>
+          </p:cNvPr>
+          <p:cNvSpPr/>
+          <p:nvPr/>
+        </p:nvSpPr>
+        <p:spPr>
+          <a:xfrm>
+            <a:off x="6022428" y="1591004"/>
+            <a:ext cx="1935126" cy="710680"/>
+          </a:xfrm>
+          <a:prstGeom prst="rect">
+            <a:avLst/>
+          </a:prstGeom>
+        </p:spPr>
+        <p:style>
+          <a:lnRef idx="2">
+            <a:schemeClr val="accent1">
+              <a:shade val="15000"/>
+            </a:schemeClr>
+          </a:lnRef>
+          <a:fillRef idx="1">
+            <a:schemeClr val="accent1"/>
+          </a:fillRef>
+          <a:effectRef idx="0">
+            <a:schemeClr val="accent1"/>
+          </a:effectRef>
+          <a:fontRef idx="minor">
+            <a:schemeClr val="lt1"/>
+          </a:fontRef>
+        </p:style>
+        <p:txBody>
+          <a:bodyPr rtlCol="0" anchor="ctr"/>
+          <a:lstStyle/>
+          <a:p>
+            <a:pPr algn="ctr"/>
+            <a:r>
+              <a:rPr lang="en-US" altLang="zh-CN" b="1" dirty="0"/>
+              <a:t>Drop nans target </a:t>
+            </a:r>
+            <a:r>
+              <a:rPr lang="en-US" altLang="zh-CN" b="1" dirty="0" err="1"/>
+              <a:t>obs</a:t>
+            </a:r>
+            <a:endParaRPr lang="zh-CN" altLang="en-US" b="1" dirty="0"/>
+          </a:p>
+        </p:txBody>
+      </p:sp>
+      <p:sp>
+        <p:nvSpPr>
+          <p:cNvPr id="6" name="Rectangle 5">
+            <a:extLst>
+              <a:ext uri="{FF2B5EF4-FFF2-40B4-BE49-F238E27FC236}">
+                <a16:creationId xmlns:a16="http://schemas.microsoft.com/office/drawing/2014/main" id="{C6D63070-8E20-88A4-7A41-D433D5EF6C0E}"/>
+              </a:ext>
+            </a:extLst>
+          </p:cNvPr>
+          <p:cNvSpPr/>
+          <p:nvPr/>
+        </p:nvSpPr>
+        <p:spPr>
+          <a:xfrm>
+            <a:off x="8459466" y="1591004"/>
+            <a:ext cx="1935126" cy="710680"/>
+          </a:xfrm>
+          <a:prstGeom prst="rect">
+            <a:avLst/>
+          </a:prstGeom>
+        </p:spPr>
+        <p:style>
+          <a:lnRef idx="2">
+            <a:schemeClr val="accent1">
+              <a:shade val="15000"/>
+            </a:schemeClr>
+          </a:lnRef>
+          <a:fillRef idx="1">
+            <a:schemeClr val="accent1"/>
+          </a:fillRef>
+          <a:effectRef idx="0">
+            <a:schemeClr val="accent1"/>
+          </a:effectRef>
+          <a:fontRef idx="minor">
+            <a:schemeClr val="lt1"/>
+          </a:fontRef>
+        </p:style>
+        <p:txBody>
+          <a:bodyPr rtlCol="0" anchor="ctr"/>
+          <a:lstStyle/>
+          <a:p>
+            <a:pPr algn="ctr"/>
+            <a:r>
+              <a:rPr lang="en-US" altLang="zh-CN" b="1" dirty="0"/>
+              <a:t>0/1 encoding target</a:t>
+            </a:r>
+            <a:endParaRPr lang="zh-CN" altLang="en-US" b="1" dirty="0"/>
+          </a:p>
+        </p:txBody>
+      </p:sp>
+      <p:sp>
+        <p:nvSpPr>
+          <p:cNvPr id="8" name="Rectangle 7">
+            <a:extLst>
+              <a:ext uri="{FF2B5EF4-FFF2-40B4-BE49-F238E27FC236}">
+                <a16:creationId xmlns:a16="http://schemas.microsoft.com/office/drawing/2014/main" id="{7AABE6BE-D7E4-CAD5-34D2-47F569EC1404}"/>
+              </a:ext>
+            </a:extLst>
+          </p:cNvPr>
+          <p:cNvSpPr/>
+          <p:nvPr/>
+        </p:nvSpPr>
+        <p:spPr>
+          <a:xfrm>
+            <a:off x="1148350" y="2807050"/>
+            <a:ext cx="1935126" cy="710680"/>
+          </a:xfrm>
+          <a:prstGeom prst="rect">
+            <a:avLst/>
+          </a:prstGeom>
+        </p:spPr>
+        <p:style>
+          <a:lnRef idx="2">
+            <a:schemeClr val="accent1">
+              <a:shade val="15000"/>
+            </a:schemeClr>
+          </a:lnRef>
+          <a:fillRef idx="1">
+            <a:schemeClr val="accent1"/>
+          </a:fillRef>
+          <a:effectRef idx="0">
+            <a:schemeClr val="accent1"/>
+          </a:effectRef>
+          <a:fontRef idx="minor">
+            <a:schemeClr val="lt1"/>
+          </a:fontRef>
+        </p:style>
+        <p:txBody>
+          <a:bodyPr rtlCol="0" anchor="ctr"/>
+          <a:lstStyle/>
+          <a:p>
+            <a:pPr algn="ctr"/>
+            <a:r>
+              <a:rPr lang="en-US" altLang="zh-CN" b="1" dirty="0"/>
+              <a:t>Train/Test split</a:t>
+            </a:r>
+            <a:endParaRPr lang="zh-CN" altLang="en-US" b="1" dirty="0"/>
+          </a:p>
+        </p:txBody>
+      </p:sp>
+      <p:sp>
+        <p:nvSpPr>
+          <p:cNvPr id="9" name="Rectangle 8">
+            <a:extLst>
+              <a:ext uri="{FF2B5EF4-FFF2-40B4-BE49-F238E27FC236}">
+                <a16:creationId xmlns:a16="http://schemas.microsoft.com/office/drawing/2014/main" id="{EDAE7E6D-AFFE-D4E9-3D7E-74DE1E9EE9A5}"/>
+              </a:ext>
+            </a:extLst>
+          </p:cNvPr>
+          <p:cNvSpPr/>
+          <p:nvPr/>
+        </p:nvSpPr>
+        <p:spPr>
+          <a:xfrm>
+            <a:off x="3585389" y="2807050"/>
+            <a:ext cx="1935126" cy="710680"/>
+          </a:xfrm>
+          <a:prstGeom prst="rect">
+            <a:avLst/>
+          </a:prstGeom>
+        </p:spPr>
+        <p:style>
+          <a:lnRef idx="2">
+            <a:schemeClr val="accent1">
+              <a:shade val="15000"/>
+            </a:schemeClr>
+          </a:lnRef>
+          <a:fillRef idx="1">
+            <a:schemeClr val="accent1"/>
+          </a:fillRef>
+          <a:effectRef idx="0">
+            <a:schemeClr val="accent1"/>
+          </a:effectRef>
+          <a:fontRef idx="minor">
+            <a:schemeClr val="lt1"/>
+          </a:fontRef>
+        </p:style>
+        <p:txBody>
+          <a:bodyPr rtlCol="0" anchor="ctr"/>
+          <a:lstStyle/>
+          <a:p>
+            <a:pPr algn="ctr"/>
+            <a:r>
+              <a:rPr lang="en-US" altLang="zh-CN" b="1" dirty="0"/>
+              <a:t>Train/Validation split</a:t>
+            </a:r>
+            <a:endParaRPr lang="zh-CN" altLang="en-US" b="1" dirty="0"/>
+          </a:p>
+        </p:txBody>
+      </p:sp>
+      <p:sp>
+        <p:nvSpPr>
+          <p:cNvPr id="10" name="Rectangle 9">
+            <a:extLst>
+              <a:ext uri="{FF2B5EF4-FFF2-40B4-BE49-F238E27FC236}">
+                <a16:creationId xmlns:a16="http://schemas.microsoft.com/office/drawing/2014/main" id="{40BA64EB-6318-668C-501D-4591E66CE1DF}"/>
+              </a:ext>
+            </a:extLst>
+          </p:cNvPr>
+          <p:cNvSpPr/>
+          <p:nvPr/>
+        </p:nvSpPr>
+        <p:spPr>
+          <a:xfrm>
+            <a:off x="6022428" y="2812168"/>
+            <a:ext cx="1935126" cy="710680"/>
+          </a:xfrm>
+          <a:prstGeom prst="rect">
+            <a:avLst/>
+          </a:prstGeom>
+        </p:spPr>
+        <p:style>
+          <a:lnRef idx="2">
+            <a:schemeClr val="accent1">
+              <a:shade val="15000"/>
+            </a:schemeClr>
+          </a:lnRef>
+          <a:fillRef idx="1">
+            <a:schemeClr val="accent1"/>
+          </a:fillRef>
+          <a:effectRef idx="0">
+            <a:schemeClr val="accent1"/>
+          </a:effectRef>
+          <a:fontRef idx="minor">
+            <a:schemeClr val="lt1"/>
+          </a:fontRef>
+        </p:style>
+        <p:txBody>
+          <a:bodyPr rtlCol="0" anchor="ctr"/>
+          <a:lstStyle/>
+          <a:p>
+            <a:pPr algn="ctr"/>
+            <a:r>
+              <a:rPr lang="en-US" altLang="zh-CN" b="1" dirty="0"/>
+              <a:t>Check out and drop missingness</a:t>
+            </a:r>
+            <a:endParaRPr lang="zh-CN" altLang="en-US" b="1" dirty="0"/>
+          </a:p>
+        </p:txBody>
+      </p:sp>
+      <p:sp>
+        <p:nvSpPr>
+          <p:cNvPr id="12" name="Rectangle 11">
+            <a:extLst>
+              <a:ext uri="{FF2B5EF4-FFF2-40B4-BE49-F238E27FC236}">
+                <a16:creationId xmlns:a16="http://schemas.microsoft.com/office/drawing/2014/main" id="{AE051862-CFFC-E954-A500-DF544295E85E}"/>
+              </a:ext>
+            </a:extLst>
+          </p:cNvPr>
+          <p:cNvSpPr/>
+          <p:nvPr/>
+        </p:nvSpPr>
+        <p:spPr>
+          <a:xfrm>
+            <a:off x="8459466" y="2807050"/>
+            <a:ext cx="1935126" cy="710680"/>
+          </a:xfrm>
+          <a:prstGeom prst="rect">
+            <a:avLst/>
+          </a:prstGeom>
+        </p:spPr>
+        <p:style>
+          <a:lnRef idx="2">
+            <a:schemeClr val="accent1">
+              <a:shade val="15000"/>
+            </a:schemeClr>
+          </a:lnRef>
+          <a:fillRef idx="1">
+            <a:schemeClr val="accent1"/>
+          </a:fillRef>
+          <a:effectRef idx="0">
+            <a:schemeClr val="accent1"/>
+          </a:effectRef>
+          <a:fontRef idx="minor">
+            <a:schemeClr val="lt1"/>
+          </a:fontRef>
+        </p:style>
+        <p:txBody>
+          <a:bodyPr rtlCol="0" anchor="ctr"/>
+          <a:lstStyle/>
+          <a:p>
+            <a:pPr algn="ctr"/>
+            <a:r>
+              <a:rPr lang="en-US" altLang="zh-CN" b="1" dirty="0"/>
+              <a:t>Identify attributes types</a:t>
+            </a:r>
+            <a:endParaRPr lang="zh-CN" altLang="en-US" b="1" dirty="0"/>
+          </a:p>
+        </p:txBody>
+      </p:sp>
+      <p:sp>
+        <p:nvSpPr>
+          <p:cNvPr id="13" name="Rectangle 12">
+            <a:extLst>
+              <a:ext uri="{FF2B5EF4-FFF2-40B4-BE49-F238E27FC236}">
+                <a16:creationId xmlns:a16="http://schemas.microsoft.com/office/drawing/2014/main" id="{E341BC7E-4025-EB07-DA0C-F14C1C3C560F}"/>
+              </a:ext>
+            </a:extLst>
+          </p:cNvPr>
+          <p:cNvSpPr/>
+          <p:nvPr/>
+        </p:nvSpPr>
+        <p:spPr>
+          <a:xfrm>
+            <a:off x="1148350" y="4023097"/>
+            <a:ext cx="1935126" cy="710680"/>
+          </a:xfrm>
+          <a:prstGeom prst="rect">
+            <a:avLst/>
+          </a:prstGeom>
+        </p:spPr>
+        <p:style>
+          <a:lnRef idx="2">
+            <a:schemeClr val="accent1">
+              <a:shade val="15000"/>
+            </a:schemeClr>
+          </a:lnRef>
+          <a:fillRef idx="1">
+            <a:schemeClr val="accent1"/>
+          </a:fillRef>
+          <a:effectRef idx="0">
+            <a:schemeClr val="accent1"/>
+          </a:effectRef>
+          <a:fontRef idx="minor">
+            <a:schemeClr val="lt1"/>
+          </a:fontRef>
+        </p:style>
+        <p:txBody>
+          <a:bodyPr rtlCol="0" anchor="ctr"/>
+          <a:lstStyle/>
+          <a:p>
+            <a:pPr algn="ctr"/>
+            <a:r>
+              <a:rPr lang="en-US" altLang="zh-CN" b="1" dirty="0"/>
+              <a:t>Check out correlation</a:t>
+            </a:r>
+            <a:endParaRPr lang="zh-CN" altLang="en-US" b="1" dirty="0"/>
+          </a:p>
+        </p:txBody>
+      </p:sp>
+      <p:sp>
+        <p:nvSpPr>
+          <p:cNvPr id="14" name="Rectangle 13">
+            <a:extLst>
+              <a:ext uri="{FF2B5EF4-FFF2-40B4-BE49-F238E27FC236}">
+                <a16:creationId xmlns:a16="http://schemas.microsoft.com/office/drawing/2014/main" id="{D9B57948-0DB9-9011-0802-E9E774BD9889}"/>
+              </a:ext>
+            </a:extLst>
+          </p:cNvPr>
+          <p:cNvSpPr/>
+          <p:nvPr/>
+        </p:nvSpPr>
+        <p:spPr>
+          <a:xfrm>
+            <a:off x="3585389" y="4023096"/>
+            <a:ext cx="1935126" cy="710680"/>
+          </a:xfrm>
+          <a:prstGeom prst="rect">
+            <a:avLst/>
+          </a:prstGeom>
+        </p:spPr>
+        <p:style>
+          <a:lnRef idx="2">
+            <a:schemeClr val="accent1">
+              <a:shade val="15000"/>
+            </a:schemeClr>
+          </a:lnRef>
+          <a:fillRef idx="1">
+            <a:schemeClr val="accent1"/>
+          </a:fillRef>
+          <a:effectRef idx="0">
+            <a:schemeClr val="accent1"/>
+          </a:effectRef>
+          <a:fontRef idx="minor">
+            <a:schemeClr val="lt1"/>
+          </a:fontRef>
+        </p:style>
+        <p:txBody>
+          <a:bodyPr rtlCol="0" anchor="ctr"/>
+          <a:lstStyle/>
+          <a:p>
+            <a:pPr algn="ctr"/>
+            <a:r>
+              <a:rPr lang="en-US" altLang="zh-CN" b="1" dirty="0"/>
+              <a:t>Identify </a:t>
+            </a:r>
+            <a:r>
+              <a:rPr lang="en-US" altLang="zh-CN" b="1" dirty="0" err="1"/>
+              <a:t>drop_list</a:t>
+            </a:r>
+            <a:endParaRPr lang="zh-CN" altLang="en-US" b="1" dirty="0"/>
+          </a:p>
+        </p:txBody>
+      </p:sp>
+      <p:sp>
+        <p:nvSpPr>
+          <p:cNvPr id="15" name="Arrow: Right 18">
+            <a:extLst>
+              <a:ext uri="{FF2B5EF4-FFF2-40B4-BE49-F238E27FC236}">
+                <a16:creationId xmlns:a16="http://schemas.microsoft.com/office/drawing/2014/main" id="{B50D9248-110E-F32A-B1CE-5AC0F0E3488D}"/>
+              </a:ext>
+            </a:extLst>
+          </p:cNvPr>
+          <p:cNvSpPr/>
+          <p:nvPr/>
+        </p:nvSpPr>
+        <p:spPr>
+          <a:xfrm>
+            <a:off x="3144641" y="1884019"/>
+            <a:ext cx="379582" cy="270146"/>
+          </a:xfrm>
+          <a:prstGeom prst="rightArrow">
+            <a:avLst/>
+          </a:prstGeom>
+        </p:spPr>
+        <p:style>
+          <a:lnRef idx="2">
+            <a:schemeClr val="accent1">
+              <a:shade val="15000"/>
+            </a:schemeClr>
+          </a:lnRef>
+          <a:fillRef idx="1">
+            <a:schemeClr val="accent1"/>
+          </a:fillRef>
+          <a:effectRef idx="0">
+            <a:schemeClr val="accent1"/>
+          </a:effectRef>
+          <a:fontRef idx="minor">
+            <a:schemeClr val="lt1"/>
+          </a:fontRef>
+        </p:style>
+        <p:txBody>
+          <a:bodyPr rtlCol="0" anchor="ctr"/>
+          <a:lstStyle/>
+          <a:p>
+            <a:pPr algn="ctr"/>
+            <a:endParaRPr lang="zh-CN" altLang="en-US" b="1"/>
+          </a:p>
+        </p:txBody>
+      </p:sp>
+      <p:sp>
+        <p:nvSpPr>
+          <p:cNvPr id="16" name="Arrow: Right 19">
+            <a:extLst>
+              <a:ext uri="{FF2B5EF4-FFF2-40B4-BE49-F238E27FC236}">
+                <a16:creationId xmlns:a16="http://schemas.microsoft.com/office/drawing/2014/main" id="{7F573BBC-E566-8839-AA35-22D27B23D717}"/>
+              </a:ext>
+            </a:extLst>
+          </p:cNvPr>
+          <p:cNvSpPr/>
+          <p:nvPr/>
+        </p:nvSpPr>
+        <p:spPr>
+          <a:xfrm>
+            <a:off x="5581680" y="1888372"/>
+            <a:ext cx="379582" cy="270146"/>
+          </a:xfrm>
+          <a:prstGeom prst="rightArrow">
+            <a:avLst/>
+          </a:prstGeom>
+        </p:spPr>
+        <p:style>
+          <a:lnRef idx="2">
+            <a:schemeClr val="accent1">
+              <a:shade val="15000"/>
+            </a:schemeClr>
+          </a:lnRef>
+          <a:fillRef idx="1">
+            <a:schemeClr val="accent1"/>
+          </a:fillRef>
+          <a:effectRef idx="0">
+            <a:schemeClr val="accent1"/>
+          </a:effectRef>
+          <a:fontRef idx="minor">
+            <a:schemeClr val="lt1"/>
+          </a:fontRef>
+        </p:style>
+        <p:txBody>
+          <a:bodyPr rtlCol="0" anchor="ctr"/>
+          <a:lstStyle/>
+          <a:p>
+            <a:pPr algn="ctr"/>
+            <a:endParaRPr lang="zh-CN" altLang="en-US" b="1"/>
+          </a:p>
+        </p:txBody>
+      </p:sp>
+      <p:sp>
+        <p:nvSpPr>
+          <p:cNvPr id="17" name="Arrow: Right 20">
+            <a:extLst>
+              <a:ext uri="{FF2B5EF4-FFF2-40B4-BE49-F238E27FC236}">
+                <a16:creationId xmlns:a16="http://schemas.microsoft.com/office/drawing/2014/main" id="{7B7ACBFA-1FB1-A65C-FBA4-C645857FF896}"/>
+              </a:ext>
+            </a:extLst>
+          </p:cNvPr>
+          <p:cNvSpPr/>
+          <p:nvPr/>
+        </p:nvSpPr>
+        <p:spPr>
+          <a:xfrm>
+            <a:off x="8018719" y="1892725"/>
+            <a:ext cx="379582" cy="270146"/>
+          </a:xfrm>
+          <a:prstGeom prst="rightArrow">
+            <a:avLst/>
+          </a:prstGeom>
+        </p:spPr>
+        <p:style>
+          <a:lnRef idx="2">
+            <a:schemeClr val="accent1">
+              <a:shade val="15000"/>
+            </a:schemeClr>
+          </a:lnRef>
+          <a:fillRef idx="1">
+            <a:schemeClr val="accent1"/>
+          </a:fillRef>
+          <a:effectRef idx="0">
+            <a:schemeClr val="accent1"/>
+          </a:effectRef>
+          <a:fontRef idx="minor">
+            <a:schemeClr val="lt1"/>
+          </a:fontRef>
+        </p:style>
+        <p:txBody>
+          <a:bodyPr rtlCol="0" anchor="ctr"/>
+          <a:lstStyle/>
+          <a:p>
+            <a:pPr algn="ctr"/>
+            <a:endParaRPr lang="zh-CN" altLang="en-US" b="1"/>
+          </a:p>
+        </p:txBody>
+      </p:sp>
+      <p:sp>
+        <p:nvSpPr>
+          <p:cNvPr id="18" name="Arrow: Right 21">
+            <a:extLst>
+              <a:ext uri="{FF2B5EF4-FFF2-40B4-BE49-F238E27FC236}">
+                <a16:creationId xmlns:a16="http://schemas.microsoft.com/office/drawing/2014/main" id="{01677442-46C4-DBB2-1410-8A8096DAFAB8}"/>
+              </a:ext>
+            </a:extLst>
+          </p:cNvPr>
+          <p:cNvSpPr/>
+          <p:nvPr/>
+        </p:nvSpPr>
+        <p:spPr>
+          <a:xfrm>
+            <a:off x="3144641" y="3079466"/>
+            <a:ext cx="379582" cy="270146"/>
+          </a:xfrm>
+          <a:prstGeom prst="rightArrow">
+            <a:avLst/>
+          </a:prstGeom>
+        </p:spPr>
+        <p:style>
+          <a:lnRef idx="2">
+            <a:schemeClr val="accent1">
+              <a:shade val="15000"/>
+            </a:schemeClr>
+          </a:lnRef>
+          <a:fillRef idx="1">
+            <a:schemeClr val="accent1"/>
+          </a:fillRef>
+          <a:effectRef idx="0">
+            <a:schemeClr val="accent1"/>
+          </a:effectRef>
+          <a:fontRef idx="minor">
+            <a:schemeClr val="lt1"/>
+          </a:fontRef>
+        </p:style>
+        <p:txBody>
+          <a:bodyPr rtlCol="0" anchor="ctr"/>
+          <a:lstStyle/>
+          <a:p>
+            <a:pPr algn="ctr"/>
+            <a:endParaRPr lang="zh-CN" altLang="en-US" b="1"/>
+          </a:p>
+        </p:txBody>
+      </p:sp>
+      <p:sp>
+        <p:nvSpPr>
+          <p:cNvPr id="19" name="Arrow: Right 22">
+            <a:extLst>
+              <a:ext uri="{FF2B5EF4-FFF2-40B4-BE49-F238E27FC236}">
+                <a16:creationId xmlns:a16="http://schemas.microsoft.com/office/drawing/2014/main" id="{50751010-8F79-2320-A598-8174F38D93B7}"/>
+              </a:ext>
+            </a:extLst>
+          </p:cNvPr>
+          <p:cNvSpPr/>
+          <p:nvPr/>
+        </p:nvSpPr>
+        <p:spPr>
+          <a:xfrm>
+            <a:off x="5581680" y="3069914"/>
+            <a:ext cx="379582" cy="270146"/>
+          </a:xfrm>
+          <a:prstGeom prst="rightArrow">
+            <a:avLst/>
+          </a:prstGeom>
+        </p:spPr>
+        <p:style>
+          <a:lnRef idx="2">
+            <a:schemeClr val="accent1">
+              <a:shade val="15000"/>
+            </a:schemeClr>
+          </a:lnRef>
+          <a:fillRef idx="1">
+            <a:schemeClr val="accent1"/>
+          </a:fillRef>
+          <a:effectRef idx="0">
+            <a:schemeClr val="accent1"/>
+          </a:effectRef>
+          <a:fontRef idx="minor">
+            <a:schemeClr val="lt1"/>
+          </a:fontRef>
+        </p:style>
+        <p:txBody>
+          <a:bodyPr rtlCol="0" anchor="ctr"/>
+          <a:lstStyle/>
+          <a:p>
+            <a:pPr algn="ctr"/>
+            <a:endParaRPr lang="zh-CN" altLang="en-US" b="1"/>
+          </a:p>
+        </p:txBody>
+      </p:sp>
+      <p:sp>
+        <p:nvSpPr>
+          <p:cNvPr id="20" name="Arrow: Right 23">
+            <a:extLst>
+              <a:ext uri="{FF2B5EF4-FFF2-40B4-BE49-F238E27FC236}">
+                <a16:creationId xmlns:a16="http://schemas.microsoft.com/office/drawing/2014/main" id="{D5782815-7368-013B-3F5C-0322003649D7}"/>
+              </a:ext>
+            </a:extLst>
+          </p:cNvPr>
+          <p:cNvSpPr/>
+          <p:nvPr/>
+        </p:nvSpPr>
+        <p:spPr>
+          <a:xfrm>
+            <a:off x="8018719" y="3060362"/>
+            <a:ext cx="379582" cy="270146"/>
+          </a:xfrm>
+          <a:prstGeom prst="rightArrow">
+            <a:avLst/>
+          </a:prstGeom>
+        </p:spPr>
+        <p:style>
+          <a:lnRef idx="2">
+            <a:schemeClr val="accent1">
+              <a:shade val="15000"/>
+            </a:schemeClr>
+          </a:lnRef>
+          <a:fillRef idx="1">
+            <a:schemeClr val="accent1"/>
+          </a:fillRef>
+          <a:effectRef idx="0">
+            <a:schemeClr val="accent1"/>
+          </a:effectRef>
+          <a:fontRef idx="minor">
+            <a:schemeClr val="lt1"/>
+          </a:fontRef>
+        </p:style>
+        <p:txBody>
+          <a:bodyPr rtlCol="0" anchor="ctr"/>
+          <a:lstStyle/>
+          <a:p>
+            <a:pPr algn="ctr"/>
+            <a:endParaRPr lang="zh-CN" altLang="en-US" b="1"/>
+          </a:p>
+        </p:txBody>
+      </p:sp>
+      <p:sp>
+        <p:nvSpPr>
+          <p:cNvPr id="21" name="Arrow: Right 24">
+            <a:extLst>
+              <a:ext uri="{FF2B5EF4-FFF2-40B4-BE49-F238E27FC236}">
+                <a16:creationId xmlns:a16="http://schemas.microsoft.com/office/drawing/2014/main" id="{463B517A-9B6A-A53C-6988-265613A1735B}"/>
+              </a:ext>
+            </a:extLst>
+          </p:cNvPr>
+          <p:cNvSpPr/>
+          <p:nvPr/>
+        </p:nvSpPr>
+        <p:spPr>
+          <a:xfrm>
+            <a:off x="3144641" y="4295512"/>
+            <a:ext cx="379582" cy="270146"/>
+          </a:xfrm>
+          <a:prstGeom prst="rightArrow">
+            <a:avLst/>
+          </a:prstGeom>
+        </p:spPr>
+        <p:style>
+          <a:lnRef idx="2">
+            <a:schemeClr val="accent1">
+              <a:shade val="15000"/>
+            </a:schemeClr>
+          </a:lnRef>
+          <a:fillRef idx="1">
+            <a:schemeClr val="accent1"/>
+          </a:fillRef>
+          <a:effectRef idx="0">
+            <a:schemeClr val="accent1"/>
+          </a:effectRef>
+          <a:fontRef idx="minor">
+            <a:schemeClr val="lt1"/>
+          </a:fontRef>
+        </p:style>
+        <p:txBody>
+          <a:bodyPr rtlCol="0" anchor="ctr"/>
+          <a:lstStyle/>
+          <a:p>
+            <a:pPr algn="ctr"/>
+            <a:endParaRPr lang="zh-CN" altLang="en-US" b="1"/>
+          </a:p>
+        </p:txBody>
+      </p:sp>
+      <p:sp>
+        <p:nvSpPr>
+          <p:cNvPr id="22" name="Arrow: Right 24">
+            <a:extLst>
+              <a:ext uri="{FF2B5EF4-FFF2-40B4-BE49-F238E27FC236}">
+                <a16:creationId xmlns:a16="http://schemas.microsoft.com/office/drawing/2014/main" id="{B3A724C3-0DF2-916A-CB31-C2B2D735C0B7}"/>
+              </a:ext>
+            </a:extLst>
+          </p:cNvPr>
+          <p:cNvSpPr/>
+          <p:nvPr/>
+        </p:nvSpPr>
+        <p:spPr>
+          <a:xfrm rot="5400000">
+            <a:off x="9237238" y="2441420"/>
+            <a:ext cx="379582" cy="270146"/>
+          </a:xfrm>
+          <a:prstGeom prst="rightArrow">
+            <a:avLst/>
+          </a:prstGeom>
+        </p:spPr>
+        <p:style>
+          <a:lnRef idx="2">
+            <a:schemeClr val="accent1">
+              <a:shade val="15000"/>
+            </a:schemeClr>
+          </a:lnRef>
+          <a:fillRef idx="1">
+            <a:schemeClr val="accent1"/>
+          </a:fillRef>
+          <a:effectRef idx="0">
+            <a:schemeClr val="accent1"/>
+          </a:effectRef>
+          <a:fontRef idx="minor">
+            <a:schemeClr val="lt1"/>
+          </a:fontRef>
+        </p:style>
+        <p:txBody>
+          <a:bodyPr rtlCol="0" anchor="ctr"/>
+          <a:lstStyle/>
+          <a:p>
+            <a:pPr algn="ctr"/>
+            <a:endParaRPr lang="zh-CN" altLang="en-US" b="1"/>
+          </a:p>
+        </p:txBody>
+      </p:sp>
+      <p:sp>
+        <p:nvSpPr>
+          <p:cNvPr id="24" name="Arrow: Right 24">
+            <a:extLst>
+              <a:ext uri="{FF2B5EF4-FFF2-40B4-BE49-F238E27FC236}">
+                <a16:creationId xmlns:a16="http://schemas.microsoft.com/office/drawing/2014/main" id="{0F351122-DE47-44C6-EEFD-82DFFC96C2A7}"/>
+              </a:ext>
+            </a:extLst>
+          </p:cNvPr>
+          <p:cNvSpPr/>
+          <p:nvPr/>
+        </p:nvSpPr>
+        <p:spPr>
+          <a:xfrm rot="5400000">
+            <a:off x="1926122" y="3635340"/>
+            <a:ext cx="379582" cy="270146"/>
+          </a:xfrm>
+          <a:prstGeom prst="rightArrow">
+            <a:avLst/>
+          </a:prstGeom>
+        </p:spPr>
+        <p:style>
+          <a:lnRef idx="2">
+            <a:schemeClr val="accent1">
+              <a:shade val="15000"/>
+            </a:schemeClr>
+          </a:lnRef>
+          <a:fillRef idx="1">
+            <a:schemeClr val="accent1"/>
+          </a:fillRef>
+          <a:effectRef idx="0">
+            <a:schemeClr val="accent1"/>
+          </a:effectRef>
+          <a:fontRef idx="minor">
+            <a:schemeClr val="lt1"/>
+          </a:fontRef>
+        </p:style>
+        <p:txBody>
+          <a:bodyPr rtlCol="0" anchor="ctr"/>
+          <a:lstStyle/>
+          <a:p>
+            <a:pPr algn="ctr"/>
+            <a:endParaRPr lang="zh-CN" altLang="en-US" b="1"/>
           </a:p>
         </p:txBody>
       </p:sp>

</xml_diff>